<commit_message>
Add note to check if everyone can access the chat
</commit_message>
<xml_diff>
--- a/Workshops/WelcomePresentation_online.pptx
+++ b/Workshops/WelcomePresentation_online.pptx
@@ -949,6 +949,208 @@
             <a:fld id="{18BDFEC3-8487-43E8-A154-7C12CBC1FFF2}" type="slidenum">
               <a:rPr lang="en-US"/>
               <a:t>4</a:t>
+            </a:fld>
+            <a:endParaRPr lang="en-US"/>
+          </a:p>
+        </p:txBody>
+      </p:sp>
+    </p:spTree>
+  </p:cSld>
+</p:notes>
+</file>
+
+<file path=ppt/notesSlides/notesSlide3.xml><?xml version="1.0" encoding="utf-8"?>
+<p:notes xmlns:a="http://schemas.openxmlformats.org/drawingml/2006/main" xmlns:r="http://schemas.openxmlformats.org/officeDocument/2006/relationships" xmlns:p="http://schemas.openxmlformats.org/presentationml/2006/main">
+  <p:cSld>
+    <p:spTree>
+      <p:nvGrpSpPr>
+        <p:cNvPr id="1" name=""/>
+        <p:cNvGrpSpPr/>
+        <p:nvPr/>
+      </p:nvGrpSpPr>
+      <p:grpSpPr>
+        <a:xfrm>
+          <a:off x="0" y="0"/>
+          <a:ext cx="0" cy="0"/>
+          <a:chOff x="0" y="0"/>
+          <a:chExt cx="0" cy="0"/>
+        </a:xfrm>
+      </p:grpSpPr>
+      <p:sp>
+        <p:nvSpPr>
+          <p:cNvPr id="2" name="Slide Image Placeholder 1"/>
+          <p:cNvSpPr>
+            <a:spLocks noGrp="1" noRot="1" noChangeAspect="1"/>
+          </p:cNvSpPr>
+          <p:nvPr>
+            <p:ph type="sldImg"/>
+          </p:nvPr>
+        </p:nvSpPr>
+        <p:spPr/>
+      </p:sp>
+      <p:sp>
+        <p:nvSpPr>
+          <p:cNvPr id="3" name="Notes Placeholder 2"/>
+          <p:cNvSpPr>
+            <a:spLocks noGrp="1"/>
+          </p:cNvSpPr>
+          <p:nvPr>
+            <p:ph type="body" idx="1"/>
+          </p:nvPr>
+        </p:nvSpPr>
+        <p:spPr/>
+        <p:txBody>
+          <a:bodyPr/>
+          <a:lstStyle/>
+          <a:p>
+            <a:pPr lvl="0" marL="0" indent="0">
+              <a:buNone/>
+            </a:pPr>
+            <a:r>
+              <a:rPr/>
+              <a:t>Might</a:t>
+            </a:r>
+            <a:r>
+              <a:rPr/>
+              <a:t> </a:t>
+            </a:r>
+            <a:r>
+              <a:rPr/>
+              <a:t>be</a:t>
+            </a:r>
+            <a:r>
+              <a:rPr/>
+              <a:t> </a:t>
+            </a:r>
+            <a:r>
+              <a:rPr/>
+              <a:t>worth</a:t>
+            </a:r>
+            <a:r>
+              <a:rPr/>
+              <a:t> </a:t>
+            </a:r>
+            <a:r>
+              <a:rPr/>
+              <a:t>checking</a:t>
+            </a:r>
+            <a:r>
+              <a:rPr/>
+              <a:t> </a:t>
+            </a:r>
+            <a:r>
+              <a:rPr/>
+              <a:t>if</a:t>
+            </a:r>
+            <a:r>
+              <a:rPr/>
+              <a:t> </a:t>
+            </a:r>
+            <a:r>
+              <a:rPr/>
+              <a:t>everyone</a:t>
+            </a:r>
+            <a:r>
+              <a:rPr/>
+              <a:t> </a:t>
+            </a:r>
+            <a:r>
+              <a:rPr/>
+              <a:t>can</a:t>
+            </a:r>
+            <a:r>
+              <a:rPr/>
+              <a:t> </a:t>
+            </a:r>
+            <a:r>
+              <a:rPr/>
+              <a:t>access</a:t>
+            </a:r>
+            <a:r>
+              <a:rPr/>
+              <a:t> </a:t>
+            </a:r>
+            <a:r>
+              <a:rPr/>
+              <a:t>the</a:t>
+            </a:r>
+            <a:r>
+              <a:rPr/>
+              <a:t> </a:t>
+            </a:r>
+            <a:r>
+              <a:rPr/>
+              <a:t>chat.</a:t>
+            </a:r>
+            <a:r>
+              <a:rPr/>
+              <a:t> </a:t>
+            </a:r>
+            <a:r>
+              <a:rPr/>
+              <a:t>We’ve</a:t>
+            </a:r>
+            <a:r>
+              <a:rPr/>
+              <a:t> </a:t>
+            </a:r>
+            <a:r>
+              <a:rPr/>
+              <a:t>had</a:t>
+            </a:r>
+            <a:r>
+              <a:rPr/>
+              <a:t> </a:t>
+            </a:r>
+            <a:r>
+              <a:rPr/>
+              <a:t>issues</a:t>
+            </a:r>
+            <a:r>
+              <a:rPr/>
+              <a:t> </a:t>
+            </a:r>
+            <a:r>
+              <a:rPr/>
+              <a:t>with</a:t>
+            </a:r>
+            <a:r>
+              <a:rPr/>
+              <a:t> </a:t>
+            </a:r>
+            <a:r>
+              <a:rPr/>
+              <a:t>this</a:t>
+            </a:r>
+            <a:r>
+              <a:rPr/>
+              <a:t> </a:t>
+            </a:r>
+            <a:r>
+              <a:rPr/>
+              <a:t>before.</a:t>
+            </a:r>
+          </a:p>
+        </p:txBody>
+      </p:sp>
+      <p:sp>
+        <p:nvSpPr>
+          <p:cNvPr id="4" name="Slide Number Placeholder 3"/>
+          <p:cNvSpPr>
+            <a:spLocks noGrp="1"/>
+          </p:cNvSpPr>
+          <p:nvPr>
+            <p:ph type="sldNum" sz="quarter" idx="10"/>
+          </p:nvPr>
+        </p:nvSpPr>
+        <p:spPr/>
+        <p:txBody>
+          <a:bodyPr/>
+          <a:lstStyle/>
+          <a:p>
+            <a:fld id="{18BDFEC3-8487-43E8-A154-7C12CBC1FFF2}" type="slidenum">
+              <a:rPr lang="en-US"/>
+              <a:t>7</a:t>
             </a:fld>
             <a:endParaRPr lang="en-US"/>
           </a:p>

</xml_diff>